<commit_message>
Add doc that contains value proposition for portfolio project
</commit_message>
<xml_diff>
--- a/02-ux-design-process/Week3/Problem-Hypothesis-Statement-Portfolio-Project/Google UX Design Certificate - Problem Statement [Template].pptx
+++ b/02-ux-design-process/Week3/Problem-Hypothesis-Statement-Portfolio-Project/Google UX Design Certificate - Problem Statement [Template].pptx
@@ -2672,16 +2672,7 @@
                 </a:solidFill>
                 <a:latin typeface="Arial"/>
               </a:rPr>
-              <a:t>Seventh Outline </a:t>
-            </a:r>
-            <a:r>
-              <a:rPr b="0" lang="en-US" sz="1400" spc="-1" strike="noStrike">
-                <a:solidFill>
-                  <a:srgbClr val="000000"/>
-                </a:solidFill>
-                <a:latin typeface="Arial"/>
-              </a:rPr>
-              <a:t>Level</a:t>
+              <a:t>Seventh Outline Level</a:t>
             </a:r>
             <a:endParaRPr b="0" lang="en-US" sz="1400" spc="-1" strike="noStrike">
               <a:solidFill>
@@ -2738,16 +2729,7 @@
                 </a:solidFill>
                 <a:latin typeface="Arial"/>
               </a:rPr>
-              <a:t>Click to edit the outline </a:t>
-            </a:r>
-            <a:r>
-              <a:rPr b="0" lang="en-US" sz="1400" spc="-1" strike="noStrike">
-                <a:solidFill>
-                  <a:srgbClr val="000000"/>
-                </a:solidFill>
-                <a:latin typeface="Arial"/>
-              </a:rPr>
-              <a:t>text format</a:t>
+              <a:t>Click to edit the outline text format</a:t>
             </a:r>
             <a:endParaRPr b="0" lang="en-US" sz="1400" spc="-1" strike="noStrike">
               <a:solidFill>
@@ -2775,16 +2757,7 @@
                 </a:solidFill>
                 <a:latin typeface="Arial"/>
               </a:rPr>
-              <a:t>Second Outline </a:t>
-            </a:r>
-            <a:r>
-              <a:rPr b="0" lang="en-US" sz="1400" spc="-1" strike="noStrike">
-                <a:solidFill>
-                  <a:srgbClr val="000000"/>
-                </a:solidFill>
-                <a:latin typeface="Arial"/>
-              </a:rPr>
-              <a:t>Level</a:t>
+              <a:t>Second Outline Level</a:t>
             </a:r>
             <a:endParaRPr b="0" lang="en-US" sz="1400" spc="-1" strike="noStrike">
               <a:solidFill>
@@ -2812,16 +2785,7 @@
                 </a:solidFill>
                 <a:latin typeface="Arial"/>
               </a:rPr>
-              <a:t>Third Outline </a:t>
-            </a:r>
-            <a:r>
-              <a:rPr b="0" lang="en-US" sz="1400" spc="-1" strike="noStrike">
-                <a:solidFill>
-                  <a:srgbClr val="000000"/>
-                </a:solidFill>
-                <a:latin typeface="Arial"/>
-              </a:rPr>
-              <a:t>Level</a:t>
+              <a:t>Third Outline Level</a:t>
             </a:r>
             <a:endParaRPr b="0" lang="en-US" sz="1400" spc="-1" strike="noStrike">
               <a:solidFill>
@@ -2849,25 +2813,7 @@
                 </a:solidFill>
                 <a:latin typeface="Arial"/>
               </a:rPr>
-              <a:t>Fourth </a:t>
-            </a:r>
-            <a:r>
-              <a:rPr b="0" lang="en-US" sz="1400" spc="-1" strike="noStrike">
-                <a:solidFill>
-                  <a:srgbClr val="000000"/>
-                </a:solidFill>
-                <a:latin typeface="Arial"/>
-              </a:rPr>
-              <a:t>Outline </a:t>
-            </a:r>
-            <a:r>
-              <a:rPr b="0" lang="en-US" sz="1400" spc="-1" strike="noStrike">
-                <a:solidFill>
-                  <a:srgbClr val="000000"/>
-                </a:solidFill>
-                <a:latin typeface="Arial"/>
-              </a:rPr>
-              <a:t>Level</a:t>
+              <a:t>Fourth Outline Level</a:t>
             </a:r>
             <a:endParaRPr b="0" lang="en-US" sz="1400" spc="-1" strike="noStrike">
               <a:solidFill>
@@ -2895,52 +2841,7 @@
                 </a:solidFill>
                 <a:latin typeface="Arial"/>
               </a:rPr>
-              <a:t>Fift</a:t>
-            </a:r>
-            <a:r>
-              <a:rPr b="0" lang="en-US" sz="1400" spc="-1" strike="noStrike">
-                <a:solidFill>
-                  <a:srgbClr val="000000"/>
-                </a:solidFill>
-                <a:latin typeface="Arial"/>
-              </a:rPr>
-              <a:t>h </a:t>
-            </a:r>
-            <a:r>
-              <a:rPr b="0" lang="en-US" sz="1400" spc="-1" strike="noStrike">
-                <a:solidFill>
-                  <a:srgbClr val="000000"/>
-                </a:solidFill>
-                <a:latin typeface="Arial"/>
-              </a:rPr>
-              <a:t>Out</a:t>
-            </a:r>
-            <a:r>
-              <a:rPr b="0" lang="en-US" sz="1400" spc="-1" strike="noStrike">
-                <a:solidFill>
-                  <a:srgbClr val="000000"/>
-                </a:solidFill>
-                <a:latin typeface="Arial"/>
-              </a:rPr>
-              <a:t>line </a:t>
-            </a:r>
-            <a:r>
-              <a:rPr b="0" lang="en-US" sz="1400" spc="-1" strike="noStrike">
-                <a:solidFill>
-                  <a:srgbClr val="000000"/>
-                </a:solidFill>
-                <a:latin typeface="Arial"/>
-              </a:rPr>
-              <a:t>Lev</a:t>
-            </a:r>
-            <a:r>
-              <a:rPr b="0" lang="en-US" sz="1400" spc="-1" strike="noStrike">
-                <a:solidFill>
-                  <a:srgbClr val="000000"/>
-                </a:solidFill>
-                <a:latin typeface="Arial"/>
-              </a:rPr>
-              <a:t>el</a:t>
+              <a:t>Fifth Outline Level</a:t>
             </a:r>
             <a:endParaRPr b="0" lang="en-US" sz="1400" spc="-1" strike="noStrike">
               <a:solidFill>
@@ -2968,169 +2869,7 @@
                 </a:solidFill>
                 <a:latin typeface="Arial"/>
               </a:rPr>
-              <a:t>S</a:t>
-            </a:r>
-            <a:r>
-              <a:rPr b="0" lang="en-US" sz="1400" spc="-1" strike="noStrike">
-                <a:solidFill>
-                  <a:srgbClr val="000000"/>
-                </a:solidFill>
-                <a:latin typeface="Arial"/>
-              </a:rPr>
-              <a:t>i</a:t>
-            </a:r>
-            <a:r>
-              <a:rPr b="0" lang="en-US" sz="1400" spc="-1" strike="noStrike">
-                <a:solidFill>
-                  <a:srgbClr val="000000"/>
-                </a:solidFill>
-                <a:latin typeface="Arial"/>
-              </a:rPr>
-              <a:t>x</a:t>
-            </a:r>
-            <a:r>
-              <a:rPr b="0" lang="en-US" sz="1400" spc="-1" strike="noStrike">
-                <a:solidFill>
-                  <a:srgbClr val="000000"/>
-                </a:solidFill>
-                <a:latin typeface="Arial"/>
-              </a:rPr>
-              <a:t>t</a:t>
-            </a:r>
-            <a:r>
-              <a:rPr b="0" lang="en-US" sz="1400" spc="-1" strike="noStrike">
-                <a:solidFill>
-                  <a:srgbClr val="000000"/>
-                </a:solidFill>
-                <a:latin typeface="Arial"/>
-              </a:rPr>
-              <a:t>h</a:t>
-            </a:r>
-            <a:r>
-              <a:rPr b="0" lang="en-US" sz="1400" spc="-1" strike="noStrike">
-                <a:solidFill>
-                  <a:srgbClr val="000000"/>
-                </a:solidFill>
-                <a:latin typeface="Arial"/>
-              </a:rPr>
-              <a:t> </a:t>
-            </a:r>
-            <a:r>
-              <a:rPr b="0" lang="en-US" sz="1400" spc="-1" strike="noStrike">
-                <a:solidFill>
-                  <a:srgbClr val="000000"/>
-                </a:solidFill>
-                <a:latin typeface="Arial"/>
-              </a:rPr>
-              <a:t>O</a:t>
-            </a:r>
-            <a:r>
-              <a:rPr b="0" lang="en-US" sz="1400" spc="-1" strike="noStrike">
-                <a:solidFill>
-                  <a:srgbClr val="000000"/>
-                </a:solidFill>
-                <a:latin typeface="Arial"/>
-              </a:rPr>
-              <a:t>u</a:t>
-            </a:r>
-            <a:r>
-              <a:rPr b="0" lang="en-US" sz="1400" spc="-1" strike="noStrike">
-                <a:solidFill>
-                  <a:srgbClr val="000000"/>
-                </a:solidFill>
-                <a:latin typeface="Arial"/>
-              </a:rPr>
-              <a:t>t</a:t>
-            </a:r>
-            <a:r>
-              <a:rPr b="0" lang="en-US" sz="1400" spc="-1" strike="noStrike">
-                <a:solidFill>
-                  <a:srgbClr val="000000"/>
-                </a:solidFill>
-                <a:latin typeface="Arial"/>
-              </a:rPr>
-              <a:t>l</a:t>
-            </a:r>
-            <a:r>
-              <a:rPr b="0" lang="en-US" sz="1400" spc="-1" strike="noStrike">
-                <a:solidFill>
-                  <a:srgbClr val="000000"/>
-                </a:solidFill>
-                <a:latin typeface="Arial"/>
-              </a:rPr>
-              <a:t>i</a:t>
-            </a:r>
-            <a:r>
-              <a:rPr b="0" lang="en-US" sz="1400" spc="-1" strike="noStrike">
-                <a:solidFill>
-                  <a:srgbClr val="000000"/>
-                </a:solidFill>
-                <a:latin typeface="Arial"/>
-              </a:rPr>
-              <a:t>n</a:t>
-            </a:r>
-            <a:r>
-              <a:rPr b="0" lang="en-US" sz="1400" spc="-1" strike="noStrike">
-                <a:solidFill>
-                  <a:srgbClr val="000000"/>
-                </a:solidFill>
-                <a:latin typeface="Arial"/>
-              </a:rPr>
-              <a:t>e</a:t>
-            </a:r>
-            <a:r>
-              <a:rPr b="0" lang="en-US" sz="1400" spc="-1" strike="noStrike">
-                <a:solidFill>
-                  <a:srgbClr val="000000"/>
-                </a:solidFill>
-                <a:latin typeface="Arial"/>
-              </a:rPr>
-              <a:t> </a:t>
-            </a:r>
-            <a:r>
-              <a:rPr b="0" lang="en-US" sz="1400" spc="-1" strike="noStrike">
-                <a:solidFill>
-                  <a:srgbClr val="000000"/>
-                </a:solidFill>
-                <a:latin typeface="Arial"/>
-              </a:rPr>
-              <a:t>L</a:t>
-            </a:r>
-            <a:r>
-              <a:rPr b="0" lang="en-US" sz="1400" spc="-1" strike="noStrike">
-                <a:solidFill>
-                  <a:srgbClr val="000000"/>
-                </a:solidFill>
-                <a:latin typeface="Arial"/>
-              </a:rPr>
-              <a:t>e</a:t>
-            </a:r>
-            <a:r>
-              <a:rPr b="0" lang="en-US" sz="1400" spc="-1" strike="noStrike">
-                <a:solidFill>
-                  <a:srgbClr val="000000"/>
-                </a:solidFill>
-                <a:latin typeface="Arial"/>
-              </a:rPr>
-              <a:t>v</a:t>
-            </a:r>
-            <a:r>
-              <a:rPr b="0" lang="en-US" sz="1400" spc="-1" strike="noStrike">
-                <a:solidFill>
-                  <a:srgbClr val="000000"/>
-                </a:solidFill>
-                <a:latin typeface="Arial"/>
-              </a:rPr>
-              <a:t>e</a:t>
-            </a:r>
-            <a:r>
-              <a:rPr b="0" lang="en-US" sz="1400" spc="-1" strike="noStrike">
-                <a:solidFill>
-                  <a:srgbClr val="000000"/>
-                </a:solidFill>
-                <a:latin typeface="Arial"/>
-              </a:rPr>
-              <a:t>l</a:t>
+              <a:t>Sixth Outline Level</a:t>
             </a:r>
             <a:endParaRPr b="0" lang="en-US" sz="1400" spc="-1" strike="noStrike">
               <a:solidFill>
@@ -3158,187 +2897,7 @@
                 </a:solidFill>
                 <a:latin typeface="Arial"/>
               </a:rPr>
-              <a:t>S</a:t>
-            </a:r>
-            <a:r>
-              <a:rPr b="0" lang="en-US" sz="1400" spc="-1" strike="noStrike">
-                <a:solidFill>
-                  <a:srgbClr val="000000"/>
-                </a:solidFill>
-                <a:latin typeface="Arial"/>
-              </a:rPr>
-              <a:t>e</a:t>
-            </a:r>
-            <a:r>
-              <a:rPr b="0" lang="en-US" sz="1400" spc="-1" strike="noStrike">
-                <a:solidFill>
-                  <a:srgbClr val="000000"/>
-                </a:solidFill>
-                <a:latin typeface="Arial"/>
-              </a:rPr>
-              <a:t>v</a:t>
-            </a:r>
-            <a:r>
-              <a:rPr b="0" lang="en-US" sz="1400" spc="-1" strike="noStrike">
-                <a:solidFill>
-                  <a:srgbClr val="000000"/>
-                </a:solidFill>
-                <a:latin typeface="Arial"/>
-              </a:rPr>
-              <a:t>e</a:t>
-            </a:r>
-            <a:r>
-              <a:rPr b="0" lang="en-US" sz="1400" spc="-1" strike="noStrike">
-                <a:solidFill>
-                  <a:srgbClr val="000000"/>
-                </a:solidFill>
-                <a:latin typeface="Arial"/>
-              </a:rPr>
-              <a:t>n</a:t>
-            </a:r>
-            <a:r>
-              <a:rPr b="0" lang="en-US" sz="1400" spc="-1" strike="noStrike">
-                <a:solidFill>
-                  <a:srgbClr val="000000"/>
-                </a:solidFill>
-                <a:latin typeface="Arial"/>
-              </a:rPr>
-              <a:t>t</a:t>
-            </a:r>
-            <a:r>
-              <a:rPr b="0" lang="en-US" sz="1400" spc="-1" strike="noStrike">
-                <a:solidFill>
-                  <a:srgbClr val="000000"/>
-                </a:solidFill>
-                <a:latin typeface="Arial"/>
-              </a:rPr>
-              <a:t>h</a:t>
-            </a:r>
-            <a:r>
-              <a:rPr b="0" lang="en-US" sz="1400" spc="-1" strike="noStrike">
-                <a:solidFill>
-                  <a:srgbClr val="000000"/>
-                </a:solidFill>
-                <a:latin typeface="Arial"/>
-              </a:rPr>
-              <a:t> </a:t>
-            </a:r>
-            <a:r>
-              <a:rPr b="0" lang="en-US" sz="1400" spc="-1" strike="noStrike">
-                <a:solidFill>
-                  <a:srgbClr val="000000"/>
-                </a:solidFill>
-                <a:latin typeface="Arial"/>
-              </a:rPr>
-              <a:t>O</a:t>
-            </a:r>
-            <a:r>
-              <a:rPr b="0" lang="en-US" sz="1400" spc="-1" strike="noStrike">
-                <a:solidFill>
-                  <a:srgbClr val="000000"/>
-                </a:solidFill>
-                <a:latin typeface="Arial"/>
-              </a:rPr>
-              <a:t>u</a:t>
-            </a:r>
-            <a:r>
-              <a:rPr b="0" lang="en-US" sz="1400" spc="-1" strike="noStrike">
-                <a:solidFill>
-                  <a:srgbClr val="000000"/>
-                </a:solidFill>
-                <a:latin typeface="Arial"/>
-              </a:rPr>
-              <a:t>t</a:t>
-            </a:r>
-            <a:r>
-              <a:rPr b="0" lang="en-US" sz="1400" spc="-1" strike="noStrike">
-                <a:solidFill>
-                  <a:srgbClr val="000000"/>
-                </a:solidFill>
-                <a:latin typeface="Arial"/>
-              </a:rPr>
-              <a:t>l</a:t>
-            </a:r>
-            <a:r>
-              <a:rPr b="0" lang="en-US" sz="1400" spc="-1" strike="noStrike">
-                <a:solidFill>
-                  <a:srgbClr val="000000"/>
-                </a:solidFill>
-                <a:latin typeface="Arial"/>
-              </a:rPr>
-              <a:t>i</a:t>
-            </a:r>
-            <a:r>
-              <a:rPr b="0" lang="en-US" sz="1400" spc="-1" strike="noStrike">
-                <a:solidFill>
-                  <a:srgbClr val="000000"/>
-                </a:solidFill>
-                <a:latin typeface="Arial"/>
-              </a:rPr>
-              <a:t>n</a:t>
-            </a:r>
-            <a:r>
-              <a:rPr b="0" lang="en-US" sz="1400" spc="-1" strike="noStrike">
-                <a:solidFill>
-                  <a:srgbClr val="000000"/>
-                </a:solidFill>
-                <a:latin typeface="Arial"/>
-              </a:rPr>
-              <a:t>e</a:t>
-            </a:r>
-            <a:r>
-              <a:rPr b="0" lang="en-US" sz="1400" spc="-1" strike="noStrike">
-                <a:solidFill>
-                  <a:srgbClr val="000000"/>
-                </a:solidFill>
-                <a:latin typeface="Arial"/>
-              </a:rPr>
-              <a:t> </a:t>
-            </a:r>
-            <a:r>
-              <a:rPr b="0" lang="en-US" sz="1400" spc="-1" strike="noStrike">
-                <a:solidFill>
-                  <a:srgbClr val="000000"/>
-                </a:solidFill>
-                <a:latin typeface="Arial"/>
-              </a:rPr>
-              <a:t>L</a:t>
-            </a:r>
-            <a:r>
-              <a:rPr b="0" lang="en-US" sz="1400" spc="-1" strike="noStrike">
-                <a:solidFill>
-                  <a:srgbClr val="000000"/>
-                </a:solidFill>
-                <a:latin typeface="Arial"/>
-              </a:rPr>
-              <a:t>e</a:t>
-            </a:r>
-            <a:r>
-              <a:rPr b="0" lang="en-US" sz="1400" spc="-1" strike="noStrike">
-                <a:solidFill>
-                  <a:srgbClr val="000000"/>
-                </a:solidFill>
-                <a:latin typeface="Arial"/>
-              </a:rPr>
-              <a:t>v</a:t>
-            </a:r>
-            <a:r>
-              <a:rPr b="0" lang="en-US" sz="1400" spc="-1" strike="noStrike">
-                <a:solidFill>
-                  <a:srgbClr val="000000"/>
-                </a:solidFill>
-                <a:latin typeface="Arial"/>
-              </a:rPr>
-              <a:t>e</a:t>
-            </a:r>
-            <a:r>
-              <a:rPr b="0" lang="en-US" sz="1400" spc="-1" strike="noStrike">
-                <a:solidFill>
-                  <a:srgbClr val="000000"/>
-                </a:solidFill>
-                <a:latin typeface="Arial"/>
-              </a:rPr>
-              <a:t>l</a:t>
+              <a:t>Seventh Outline Level</a:t>
             </a:r>
             <a:endParaRPr b="0" lang="en-US" sz="1400" spc="-1" strike="noStrike">
               <a:solidFill>

</xml_diff>